<commit_message>
Created powerpoint for presentation tomorrow.
</commit_message>
<xml_diff>
--- a/parsnip.pptx
+++ b/parsnip.pptx
@@ -27274,7 +27274,7 @@
         </p:nvSpPr>
         <p:spPr>
           <a:xfrm>
-            <a:off x="684428" y="2837934"/>
+            <a:off x="684428" y="2736334"/>
             <a:ext cx="2782971" cy="523220"/>
           </a:xfrm>
           <a:prstGeom prst="rect">
@@ -27346,7 +27346,7 @@
         </p:nvSpPr>
         <p:spPr>
           <a:xfrm>
-            <a:off x="4783592" y="2837934"/>
+            <a:off x="4783592" y="2736334"/>
             <a:ext cx="3797697" cy="523220"/>
           </a:xfrm>
           <a:prstGeom prst="rect">

</xml_diff>